<commit_message>
feat: 🎸 session 04 - nest.js added
</commit_message>
<xml_diff>
--- a/nestjs/nestjs-03.pptx
+++ b/nestjs/nestjs-03.pptx
@@ -208,7 +208,7 @@
           <a:p>
             <a:fld id="{9B9ECB28-6A22-4037-9487-F3F739F744D6}" type="datetimeFigureOut">
               <a:rPr lang="en-US" smtClean="0"/>
-              <a:t>1/23/2022</a:t>
+              <a:t>1/24/2022</a:t>
             </a:fld>
             <a:endParaRPr lang="en-US"/>
           </a:p>
@@ -842,7 +842,7 @@
           <a:p>
             <a:fld id="{19B6F524-99F3-4BEA-ACD7-976EF4D36657}" type="datetime1">
               <a:rPr lang="en-US" smtClean="0"/>
-              <a:t>1/23/2022</a:t>
+              <a:t>1/24/2022</a:t>
             </a:fld>
             <a:endParaRPr lang="en-US" dirty="0"/>
           </a:p>
@@ -1151,7 +1151,7 @@
           <a:p>
             <a:fld id="{2145C3A9-05D9-428D-9788-A7F14838F6F9}" type="datetime1">
               <a:rPr lang="en-US" smtClean="0"/>
-              <a:t>1/23/2022</a:t>
+              <a:t>1/24/2022</a:t>
             </a:fld>
             <a:endParaRPr lang="en-US" dirty="0"/>
           </a:p>
@@ -1349,7 +1349,7 @@
           <a:p>
             <a:fld id="{82C701FB-B03E-4981-A9F8-99B474DD173A}" type="datetime1">
               <a:rPr lang="en-US" smtClean="0"/>
-              <a:t>1/23/2022</a:t>
+              <a:t>1/24/2022</a:t>
             </a:fld>
             <a:endParaRPr lang="en-US" dirty="0"/>
           </a:p>
@@ -1616,7 +1616,7 @@
           <a:p>
             <a:fld id="{7A7E8EF3-CBF7-4EB9-B6E5-3754574E3433}" type="datetime1">
               <a:rPr lang="en-US" smtClean="0"/>
-              <a:t>1/23/2022</a:t>
+              <a:t>1/24/2022</a:t>
             </a:fld>
             <a:endParaRPr lang="en-US" dirty="0"/>
           </a:p>
@@ -2056,7 +2056,7 @@
           <a:p>
             <a:fld id="{DA8A4A96-31AC-487C-9F15-1822D58542B7}" type="datetime1">
               <a:rPr lang="en-US" smtClean="0"/>
-              <a:t>1/23/2022</a:t>
+              <a:t>1/24/2022</a:t>
             </a:fld>
             <a:endParaRPr lang="en-US" dirty="0"/>
           </a:p>
@@ -2597,7 +2597,7 @@
           <a:p>
             <a:fld id="{FBBF9546-09C4-4F24-A284-5B81FF8659B4}" type="datetime1">
               <a:rPr lang="en-US" smtClean="0"/>
-              <a:t>1/23/2022</a:t>
+              <a:t>1/24/2022</a:t>
             </a:fld>
             <a:endParaRPr lang="en-US" dirty="0"/>
           </a:p>
@@ -3483,7 +3483,7 @@
           <a:p>
             <a:fld id="{5BF4405D-15A5-450B-B053-484859B9C8F7}" type="datetime1">
               <a:rPr lang="en-US" smtClean="0"/>
-              <a:t>1/23/2022</a:t>
+              <a:t>1/24/2022</a:t>
             </a:fld>
             <a:endParaRPr lang="en-US" dirty="0"/>
           </a:p>
@@ -3657,7 +3657,7 @@
           <a:p>
             <a:fld id="{E0366559-EC21-40C1-8A65-9A3B4EA78391}" type="datetime1">
               <a:rPr lang="en-US" smtClean="0"/>
-              <a:t>1/23/2022</a:t>
+              <a:t>1/24/2022</a:t>
             </a:fld>
             <a:endParaRPr lang="en-US" dirty="0"/>
           </a:p>
@@ -3845,7 +3845,7 @@
           <a:p>
             <a:fld id="{4F09CA92-695C-4FFA-8E37-4D2C288BCC04}" type="datetime1">
               <a:rPr lang="en-US" smtClean="0"/>
-              <a:t>1/23/2022</a:t>
+              <a:t>1/24/2022</a:t>
             </a:fld>
             <a:endParaRPr lang="en-US" dirty="0"/>
           </a:p>
@@ -4019,7 +4019,7 @@
           <a:p>
             <a:fld id="{CA551262-FC07-4FE4-9221-F72F7D4F209A}" type="datetime1">
               <a:rPr lang="en-US" smtClean="0"/>
-              <a:t>1/23/2022</a:t>
+              <a:t>1/24/2022</a:t>
             </a:fld>
             <a:endParaRPr lang="en-US" dirty="0"/>
           </a:p>
@@ -4267,7 +4267,7 @@
           <a:p>
             <a:fld id="{46A321E4-8899-4F7D-BEB1-BD52626ABD8D}" type="datetime1">
               <a:rPr lang="en-US" smtClean="0"/>
-              <a:t>1/23/2022</a:t>
+              <a:t>1/24/2022</a:t>
             </a:fld>
             <a:endParaRPr lang="en-US" dirty="0"/>
           </a:p>
@@ -4513,7 +4513,7 @@
           <a:p>
             <a:fld id="{B53F6DFA-8A0E-4513-867D-18B9AA66B23C}" type="datetime1">
               <a:rPr lang="en-US" smtClean="0"/>
-              <a:t>1/23/2022</a:t>
+              <a:t>1/24/2022</a:t>
             </a:fld>
             <a:endParaRPr lang="en-US" dirty="0"/>
           </a:p>
@@ -5000,7 +5000,7 @@
           <a:p>
             <a:fld id="{154283A7-B9AC-454B-A468-44B75A398B49}" type="datetime1">
               <a:rPr lang="en-US" smtClean="0"/>
-              <a:t>1/23/2022</a:t>
+              <a:t>1/24/2022</a:t>
             </a:fld>
             <a:endParaRPr lang="en-US" dirty="0"/>
           </a:p>
@@ -5122,7 +5122,7 @@
           <a:p>
             <a:fld id="{A3F8184D-DEDD-48A0-9ACA-5F6ED9EFE5B8}" type="datetime1">
               <a:rPr lang="en-US" smtClean="0"/>
-              <a:t>1/23/2022</a:t>
+              <a:t>1/24/2022</a:t>
             </a:fld>
             <a:endParaRPr lang="en-US" dirty="0"/>
           </a:p>
@@ -5221,7 +5221,7 @@
           <a:p>
             <a:fld id="{BF38AC0E-F520-48F3-BA14-8BAB82D735FB}" type="datetime1">
               <a:rPr lang="en-US" smtClean="0"/>
-              <a:t>1/23/2022</a:t>
+              <a:t>1/24/2022</a:t>
             </a:fld>
             <a:endParaRPr lang="en-US" dirty="0"/>
           </a:p>
@@ -5480,7 +5480,7 @@
           <a:p>
             <a:fld id="{317D0F2A-2724-4AD4-BF4C-A7B1910D9412}" type="datetime1">
               <a:rPr lang="en-US" smtClean="0"/>
-              <a:t>1/23/2022</a:t>
+              <a:t>1/24/2022</a:t>
             </a:fld>
             <a:endParaRPr lang="en-US" dirty="0"/>
           </a:p>
@@ -5791,7 +5791,7 @@
           <a:p>
             <a:fld id="{9A0B82A5-4A21-4F82-91DB-989CE997E82E}" type="datetime1">
               <a:rPr lang="en-US" smtClean="0"/>
-              <a:t>1/23/2022</a:t>
+              <a:t>1/24/2022</a:t>
             </a:fld>
             <a:endParaRPr lang="en-US" dirty="0"/>
           </a:p>
@@ -6028,7 +6028,7 @@
           <a:p>
             <a:fld id="{01BFEF8A-AE08-4951-B923-589F814B0C31}" type="datetime1">
               <a:rPr lang="en-US" smtClean="0"/>
-              <a:t>1/23/2022</a:t>
+              <a:t>1/24/2022</a:t>
             </a:fld>
             <a:endParaRPr lang="en-US" dirty="0"/>
           </a:p>
@@ -7424,9 +7424,30 @@
             </a:r>
           </a:p>
           <a:p>
+            <a:pPr lvl="1"/>
+            <a:r>
+              <a:rPr lang="en-US" dirty="0"/>
+              <a:t>Exercise all the stuff we discuss in this session yourself</a:t>
+            </a:r>
+          </a:p>
+          <a:p>
             <a:r>
               <a:rPr lang="en-US" dirty="0"/>
               <a:t>Optional:</a:t>
+            </a:r>
+          </a:p>
+          <a:p>
+            <a:pPr lvl="1"/>
+            <a:r>
+              <a:rPr lang="en-US" dirty="0"/>
+              <a:t>How to avoid a use from liking a post twice.</a:t>
+            </a:r>
+          </a:p>
+          <a:p>
+            <a:pPr lvl="1"/>
+            <a:r>
+              <a:rPr lang="en-US" dirty="0"/>
+              <a:t>Complete other relations and entities</a:t>
             </a:r>
           </a:p>
         </p:txBody>

</xml_diff>